<commit_message>
Inclusión de hojas guías
Inicio de hojas guías para programación web
</commit_message>
<xml_diff>
--- a/Programación web/PW_Sesion13.pptx
+++ b/Programación web/PW_Sesion13.pptx
@@ -6,25 +6,27 @@
     <p:sldMasterId id="2147483699" r:id="rId2"/>
   </p:sldMasterIdLst>
   <p:notesMasterIdLst>
-    <p:notesMasterId r:id="rId16"/>
+    <p:notesMasterId r:id="rId18"/>
   </p:notesMasterIdLst>
   <p:handoutMasterIdLst>
-    <p:handoutMasterId r:id="rId17"/>
+    <p:handoutMasterId r:id="rId19"/>
   </p:handoutMasterIdLst>
   <p:sldIdLst>
     <p:sldId id="256" r:id="rId3"/>
     <p:sldId id="269" r:id="rId4"/>
-    <p:sldId id="257" r:id="rId5"/>
-    <p:sldId id="258" r:id="rId6"/>
-    <p:sldId id="259" r:id="rId7"/>
-    <p:sldId id="260" r:id="rId8"/>
-    <p:sldId id="262" r:id="rId9"/>
-    <p:sldId id="263" r:id="rId10"/>
-    <p:sldId id="264" r:id="rId11"/>
-    <p:sldId id="265" r:id="rId12"/>
-    <p:sldId id="266" r:id="rId13"/>
-    <p:sldId id="267" r:id="rId14"/>
-    <p:sldId id="261" r:id="rId15"/>
+    <p:sldId id="274" r:id="rId5"/>
+    <p:sldId id="257" r:id="rId6"/>
+    <p:sldId id="258" r:id="rId7"/>
+    <p:sldId id="259" r:id="rId8"/>
+    <p:sldId id="260" r:id="rId9"/>
+    <p:sldId id="262" r:id="rId10"/>
+    <p:sldId id="263" r:id="rId11"/>
+    <p:sldId id="264" r:id="rId12"/>
+    <p:sldId id="265" r:id="rId13"/>
+    <p:sldId id="266" r:id="rId14"/>
+    <p:sldId id="267" r:id="rId15"/>
+    <p:sldId id="270" r:id="rId16"/>
+    <p:sldId id="261" r:id="rId17"/>
   </p:sldIdLst>
   <p:sldSz cx="12192000" cy="6858000"/>
   <p:notesSz cx="6858000" cy="9144000"/>
@@ -228,7 +230,7 @@
           <a:p>
             <a:fld id="{7FF7D7FF-DDC7-474C-8526-899954A31AD1}" type="datetimeFigureOut">
               <a:rPr lang="es-EC" smtClean="0"/>
-              <a:t>15/3/2024</a:t>
+              <a:t>31/3/2024</a:t>
             </a:fld>
             <a:endParaRPr lang="es-EC"/>
           </a:p>
@@ -405,7 +407,7 @@
           <a:p>
             <a:fld id="{A266080D-5226-48DF-A08B-67FADEB85FAB}" type="datetimeFigureOut">
               <a:rPr lang="es-419" smtClean="0"/>
-              <a:t>15/3/2024</a:t>
+              <a:t>31/3/2024</a:t>
             </a:fld>
             <a:endParaRPr lang="es-419"/>
           </a:p>
@@ -804,7 +806,7 @@
           <a:p>
             <a:fld id="{8FEB83C7-CE7D-EE43-931B-A983B2AE7CF3}" type="datetimeFigureOut">
               <a:rPr lang="es-EC" smtClean="0"/>
-              <a:t>15/3/2024</a:t>
+              <a:t>31/3/2024</a:t>
             </a:fld>
             <a:endParaRPr lang="es-EC"/>
           </a:p>
@@ -974,7 +976,7 @@
           <a:p>
             <a:fld id="{8FEB83C7-CE7D-EE43-931B-A983B2AE7CF3}" type="datetimeFigureOut">
               <a:rPr lang="es-EC" smtClean="0"/>
-              <a:t>15/3/2024</a:t>
+              <a:t>31/3/2024</a:t>
             </a:fld>
             <a:endParaRPr lang="es-EC"/>
           </a:p>
@@ -1154,7 +1156,7 @@
           <a:p>
             <a:fld id="{8FEB83C7-CE7D-EE43-931B-A983B2AE7CF3}" type="datetimeFigureOut">
               <a:rPr lang="es-EC" smtClean="0"/>
-              <a:t>15/3/2024</a:t>
+              <a:t>31/3/2024</a:t>
             </a:fld>
             <a:endParaRPr lang="es-EC"/>
           </a:p>
@@ -1533,7 +1535,7 @@
           <a:p>
             <a:fld id="{1D8BD707-D9CF-40AE-B4C6-C98DA3205C09}" type="datetimeFigureOut">
               <a:rPr lang="en-US"/>
-              <a:t>3/15/2024</a:t>
+              <a:t>3/31/2024</a:t>
             </a:fld>
             <a:endParaRPr lang="en-US"/>
           </a:p>
@@ -1914,7 +1916,7 @@
           <a:p>
             <a:fld id="{8FEB83C7-CE7D-EE43-931B-A983B2AE7CF3}" type="datetimeFigureOut">
               <a:rPr lang="es-EC" smtClean="0"/>
-              <a:t>15/3/2024</a:t>
+              <a:t>31/3/2024</a:t>
             </a:fld>
             <a:endParaRPr lang="es-EC"/>
           </a:p>
@@ -2160,7 +2162,7 @@
           <a:p>
             <a:fld id="{8FEB83C7-CE7D-EE43-931B-A983B2AE7CF3}" type="datetimeFigureOut">
               <a:rPr lang="es-EC" smtClean="0"/>
-              <a:t>15/3/2024</a:t>
+              <a:t>31/3/2024</a:t>
             </a:fld>
             <a:endParaRPr lang="es-EC"/>
           </a:p>
@@ -2392,7 +2394,7 @@
           <a:p>
             <a:fld id="{8FEB83C7-CE7D-EE43-931B-A983B2AE7CF3}" type="datetimeFigureOut">
               <a:rPr lang="es-EC" smtClean="0"/>
-              <a:t>15/3/2024</a:t>
+              <a:t>31/3/2024</a:t>
             </a:fld>
             <a:endParaRPr lang="es-EC"/>
           </a:p>
@@ -2759,7 +2761,7 @@
           <a:p>
             <a:fld id="{8FEB83C7-CE7D-EE43-931B-A983B2AE7CF3}" type="datetimeFigureOut">
               <a:rPr lang="es-EC" smtClean="0"/>
-              <a:t>15/3/2024</a:t>
+              <a:t>31/3/2024</a:t>
             </a:fld>
             <a:endParaRPr lang="es-EC"/>
           </a:p>
@@ -2877,7 +2879,7 @@
           <a:p>
             <a:fld id="{8FEB83C7-CE7D-EE43-931B-A983B2AE7CF3}" type="datetimeFigureOut">
               <a:rPr lang="es-EC" smtClean="0"/>
-              <a:t>15/3/2024</a:t>
+              <a:t>31/3/2024</a:t>
             </a:fld>
             <a:endParaRPr lang="es-EC"/>
           </a:p>
@@ -2972,7 +2974,7 @@
           <a:p>
             <a:fld id="{8FEB83C7-CE7D-EE43-931B-A983B2AE7CF3}" type="datetimeFigureOut">
               <a:rPr lang="es-EC" smtClean="0"/>
-              <a:t>15/3/2024</a:t>
+              <a:t>31/3/2024</a:t>
             </a:fld>
             <a:endParaRPr lang="es-EC"/>
           </a:p>
@@ -3249,7 +3251,7 @@
           <a:p>
             <a:fld id="{8FEB83C7-CE7D-EE43-931B-A983B2AE7CF3}" type="datetimeFigureOut">
               <a:rPr lang="es-EC" smtClean="0"/>
-              <a:t>15/3/2024</a:t>
+              <a:t>31/3/2024</a:t>
             </a:fld>
             <a:endParaRPr lang="es-EC"/>
           </a:p>
@@ -3506,7 +3508,7 @@
           <a:p>
             <a:fld id="{8FEB83C7-CE7D-EE43-931B-A983B2AE7CF3}" type="datetimeFigureOut">
               <a:rPr lang="es-EC" smtClean="0"/>
-              <a:t>15/3/2024</a:t>
+              <a:t>31/3/2024</a:t>
             </a:fld>
             <a:endParaRPr lang="es-EC"/>
           </a:p>
@@ -3719,7 +3721,7 @@
           <a:p>
             <a:fld id="{8FEB83C7-CE7D-EE43-931B-A983B2AE7CF3}" type="datetimeFigureOut">
               <a:rPr lang="es-EC" smtClean="0"/>
-              <a:t>15/3/2024</a:t>
+              <a:t>31/3/2024</a:t>
             </a:fld>
             <a:endParaRPr lang="es-EC"/>
           </a:p>
@@ -4256,7 +4258,7 @@
           <a:p>
             <a:fld id="{8FEB83C7-CE7D-EE43-931B-A983B2AE7CF3}" type="datetimeFigureOut">
               <a:rPr lang="es-EC" smtClean="0"/>
-              <a:t>15/3/2024</a:t>
+              <a:t>31/3/2024</a:t>
             </a:fld>
             <a:endParaRPr lang="es-EC"/>
           </a:p>
@@ -4715,8 +4717,8 @@
         </p:nvSpPr>
         <p:spPr>
           <a:xfrm>
-            <a:off x="8294029" y="5117862"/>
-            <a:ext cx="2342501" cy="369332"/>
+            <a:off x="6988677" y="5117862"/>
+            <a:ext cx="4953215" cy="369332"/>
           </a:xfrm>
           <a:prstGeom prst="rect">
             <a:avLst/>
@@ -4740,8 +4742,13 @@
             </a:r>
             <a:r>
               <a:rPr lang="es-419" dirty="0"/>
-              <a:t> </a:t>
-            </a:r>
+              <a:t> aplicada </a:t>
+            </a:r>
+            <a:r>
+              <a:rPr lang="es-419"/>
+              <a:t>en ambientes web </a:t>
+            </a:r>
+            <a:endParaRPr lang="es-419" dirty="0"/>
           </a:p>
         </p:txBody>
       </p:sp>
@@ -4759,6 +4766,674 @@
 </file>
 
 <file path=ppt/slides/slide10.xml><?xml version="1.0" encoding="utf-8"?>
+<p:sld xmlns:a="http://schemas.openxmlformats.org/drawingml/2006/main" xmlns:r="http://schemas.openxmlformats.org/officeDocument/2006/relationships" xmlns:p="http://schemas.openxmlformats.org/presentationml/2006/main">
+  <p:cSld>
+    <p:spTree>
+      <p:nvGrpSpPr>
+        <p:cNvPr id="1" name=""/>
+        <p:cNvGrpSpPr/>
+        <p:nvPr/>
+      </p:nvGrpSpPr>
+      <p:grpSpPr>
+        <a:xfrm>
+          <a:off x="0" y="0"/>
+          <a:ext cx="0" cy="0"/>
+          <a:chOff x="0" y="0"/>
+          <a:chExt cx="0" cy="0"/>
+        </a:xfrm>
+      </p:grpSpPr>
+      <p:pic>
+        <p:nvPicPr>
+          <p:cNvPr id="2" name="object 2"/>
+          <p:cNvPicPr/>
+          <p:nvPr/>
+        </p:nvPicPr>
+        <p:blipFill>
+          <a:blip r:embed="rId2" cstate="print"/>
+          <a:stretch>
+            <a:fillRect/>
+          </a:stretch>
+        </p:blipFill>
+        <p:spPr>
+          <a:xfrm>
+            <a:off x="786292" y="3104537"/>
+            <a:ext cx="10610451" cy="2987162"/>
+          </a:xfrm>
+          <a:prstGeom prst="rect">
+            <a:avLst/>
+          </a:prstGeom>
+        </p:spPr>
+      </p:pic>
+      <p:sp>
+        <p:nvSpPr>
+          <p:cNvPr id="3" name="object 3"/>
+          <p:cNvSpPr txBox="1"/>
+          <p:nvPr/>
+        </p:nvSpPr>
+        <p:spPr>
+          <a:xfrm>
+            <a:off x="775061" y="542264"/>
+            <a:ext cx="5371818" cy="2014177"/>
+          </a:xfrm>
+          <a:prstGeom prst="rect">
+            <a:avLst/>
+          </a:prstGeom>
+        </p:spPr>
+        <p:txBody>
+          <a:bodyPr vert="horz" wrap="square" lIns="0" tIns="38898" rIns="0" bIns="0" rtlCol="0">
+            <a:spAutoFit/>
+          </a:bodyPr>
+          <a:lstStyle/>
+          <a:p>
+            <a:pPr marL="8456" marR="3382">
+              <a:lnSpc>
+                <a:spcPts val="2197"/>
+              </a:lnSpc>
+              <a:spcBef>
+                <a:spcPts val="306"/>
+              </a:spcBef>
+            </a:pPr>
+            <a:r>
+              <a:rPr sz="1997" spc="-7" dirty="0">
+                <a:latin typeface="Verdana"/>
+                <a:cs typeface="Verdana"/>
+              </a:rPr>
+              <a:t>Para</a:t>
+            </a:r>
+            <a:r>
+              <a:rPr sz="1997" spc="-130" dirty="0">
+                <a:latin typeface="Verdana"/>
+                <a:cs typeface="Verdana"/>
+              </a:rPr>
+              <a:t> </a:t>
+            </a:r>
+            <a:r>
+              <a:rPr sz="1997" b="1" spc="-100" dirty="0">
+                <a:latin typeface="Verdana"/>
+                <a:cs typeface="Verdana"/>
+              </a:rPr>
+              <a:t>optimizar</a:t>
+            </a:r>
+            <a:r>
+              <a:rPr sz="1997" b="1" spc="-110" dirty="0">
+                <a:latin typeface="Verdana"/>
+                <a:cs typeface="Verdana"/>
+              </a:rPr>
+              <a:t> </a:t>
+            </a:r>
+            <a:r>
+              <a:rPr sz="1997" spc="-23" dirty="0">
+                <a:latin typeface="Verdana"/>
+                <a:cs typeface="Verdana"/>
+              </a:rPr>
+              <a:t>la</a:t>
+            </a:r>
+            <a:r>
+              <a:rPr sz="1997" spc="-130" dirty="0">
+                <a:latin typeface="Verdana"/>
+                <a:cs typeface="Verdana"/>
+              </a:rPr>
+              <a:t> </a:t>
+            </a:r>
+            <a:r>
+              <a:rPr sz="1997" dirty="0">
+                <a:latin typeface="Verdana"/>
+                <a:cs typeface="Verdana"/>
+              </a:rPr>
+              <a:t>lógica</a:t>
+            </a:r>
+            <a:r>
+              <a:rPr sz="1997" spc="-130" dirty="0">
+                <a:latin typeface="Verdana"/>
+                <a:cs typeface="Verdana"/>
+              </a:rPr>
+              <a:t> </a:t>
+            </a:r>
+            <a:r>
+              <a:rPr sz="1997" spc="60" dirty="0">
+                <a:latin typeface="Verdana"/>
+                <a:cs typeface="Verdana"/>
+              </a:rPr>
+              <a:t>de</a:t>
+            </a:r>
+            <a:r>
+              <a:rPr sz="1997" spc="-130" dirty="0">
+                <a:latin typeface="Verdana"/>
+                <a:cs typeface="Verdana"/>
+              </a:rPr>
+              <a:t> </a:t>
+            </a:r>
+            <a:r>
+              <a:rPr sz="1997" spc="-7" dirty="0">
+                <a:latin typeface="Verdana"/>
+                <a:cs typeface="Verdana"/>
+              </a:rPr>
+              <a:t>programación </a:t>
+            </a:r>
+            <a:r>
+              <a:rPr sz="1997" spc="53" dirty="0">
+                <a:latin typeface="Verdana"/>
+                <a:cs typeface="Verdana"/>
+              </a:rPr>
+              <a:t>con</a:t>
+            </a:r>
+            <a:r>
+              <a:rPr sz="1997" spc="-152" dirty="0">
+                <a:latin typeface="Verdana"/>
+                <a:cs typeface="Verdana"/>
+              </a:rPr>
+              <a:t> </a:t>
+            </a:r>
+            <a:r>
+              <a:rPr sz="1997" spc="-23" dirty="0">
+                <a:latin typeface="Verdana"/>
+                <a:cs typeface="Verdana"/>
+              </a:rPr>
+              <a:t>la</a:t>
+            </a:r>
+            <a:r>
+              <a:rPr sz="1997" spc="-150" dirty="0">
+                <a:latin typeface="Verdana"/>
+                <a:cs typeface="Verdana"/>
+              </a:rPr>
+              <a:t> </a:t>
+            </a:r>
+            <a:r>
+              <a:rPr sz="1997" dirty="0">
+                <a:latin typeface="Verdana"/>
+                <a:cs typeface="Verdana"/>
+              </a:rPr>
+              <a:t>sentencia</a:t>
+            </a:r>
+            <a:r>
+              <a:rPr sz="1997" spc="-150" dirty="0">
+                <a:latin typeface="Verdana"/>
+                <a:cs typeface="Verdana"/>
+              </a:rPr>
+              <a:t> </a:t>
+            </a:r>
+            <a:r>
+              <a:rPr sz="2064" i="1" spc="-43" dirty="0">
+                <a:latin typeface="Verdana"/>
+                <a:cs typeface="Verdana"/>
+              </a:rPr>
+              <a:t>if</a:t>
+            </a:r>
+            <a:r>
+              <a:rPr sz="2064" i="1" spc="-176" dirty="0">
+                <a:latin typeface="Verdana"/>
+                <a:cs typeface="Verdana"/>
+              </a:rPr>
+              <a:t> </a:t>
+            </a:r>
+            <a:r>
+              <a:rPr sz="1997" spc="47" dirty="0">
+                <a:latin typeface="Verdana"/>
+                <a:cs typeface="Verdana"/>
+              </a:rPr>
+              <a:t>en</a:t>
+            </a:r>
+            <a:r>
+              <a:rPr sz="1997" spc="-150" dirty="0">
+                <a:latin typeface="Verdana"/>
+                <a:cs typeface="Verdana"/>
+              </a:rPr>
+              <a:t> </a:t>
+            </a:r>
+            <a:r>
+              <a:rPr sz="1997" dirty="0">
+                <a:latin typeface="Verdana"/>
+                <a:cs typeface="Verdana"/>
+              </a:rPr>
+              <a:t>Python,</a:t>
+            </a:r>
+            <a:r>
+              <a:rPr sz="1997" spc="-150" dirty="0">
+                <a:latin typeface="Verdana"/>
+                <a:cs typeface="Verdana"/>
+              </a:rPr>
+              <a:t> </a:t>
+            </a:r>
+            <a:r>
+              <a:rPr sz="1997" spc="-17" dirty="0">
+                <a:latin typeface="Verdana"/>
+                <a:cs typeface="Verdana"/>
+              </a:rPr>
+              <a:t>es </a:t>
+            </a:r>
+            <a:r>
+              <a:rPr sz="1997" dirty="0">
+                <a:latin typeface="Verdana"/>
+                <a:cs typeface="Verdana"/>
+              </a:rPr>
+              <a:t>importante</a:t>
+            </a:r>
+            <a:r>
+              <a:rPr sz="1997" spc="-73" dirty="0">
+                <a:latin typeface="Verdana"/>
+                <a:cs typeface="Verdana"/>
+              </a:rPr>
+              <a:t> </a:t>
+            </a:r>
+            <a:r>
+              <a:rPr sz="1997" dirty="0">
+                <a:latin typeface="Verdana"/>
+                <a:cs typeface="Verdana"/>
+              </a:rPr>
+              <a:t>seguir</a:t>
+            </a:r>
+            <a:r>
+              <a:rPr sz="1997" spc="-73" dirty="0">
+                <a:latin typeface="Verdana"/>
+                <a:cs typeface="Verdana"/>
+              </a:rPr>
+              <a:t> </a:t>
+            </a:r>
+            <a:r>
+              <a:rPr sz="1997" b="1" spc="-120" dirty="0">
+                <a:latin typeface="Verdana"/>
+                <a:cs typeface="Verdana"/>
+              </a:rPr>
+              <a:t>mejores</a:t>
+            </a:r>
+            <a:r>
+              <a:rPr sz="1997" b="1" spc="-20" dirty="0">
+                <a:latin typeface="Verdana"/>
+                <a:cs typeface="Verdana"/>
+              </a:rPr>
+              <a:t> </a:t>
+            </a:r>
+            <a:r>
+              <a:rPr sz="1997" b="1" spc="-123" dirty="0">
+                <a:latin typeface="Verdana"/>
+                <a:cs typeface="Verdana"/>
+              </a:rPr>
+              <a:t>prácticas</a:t>
+            </a:r>
+            <a:r>
+              <a:rPr sz="1997" spc="-123" dirty="0">
+                <a:latin typeface="Verdana"/>
+                <a:cs typeface="Verdana"/>
+              </a:rPr>
+              <a:t>.</a:t>
+            </a:r>
+            <a:r>
+              <a:rPr sz="1997" spc="-73" dirty="0">
+                <a:latin typeface="Verdana"/>
+                <a:cs typeface="Verdana"/>
+              </a:rPr>
+              <a:t> </a:t>
+            </a:r>
+            <a:r>
+              <a:rPr sz="1997" spc="-13" dirty="0">
+                <a:latin typeface="Verdana"/>
+                <a:cs typeface="Verdana"/>
+              </a:rPr>
+              <a:t>Esto </a:t>
+            </a:r>
+            <a:r>
+              <a:rPr sz="1997" dirty="0">
+                <a:latin typeface="Verdana"/>
+                <a:cs typeface="Verdana"/>
+              </a:rPr>
+              <a:t>incluye</a:t>
+            </a:r>
+            <a:r>
+              <a:rPr sz="1997" spc="-93" dirty="0">
+                <a:latin typeface="Verdana"/>
+                <a:cs typeface="Verdana"/>
+              </a:rPr>
+              <a:t> </a:t>
+            </a:r>
+            <a:r>
+              <a:rPr sz="1997" dirty="0">
+                <a:latin typeface="Verdana"/>
+                <a:cs typeface="Verdana"/>
+              </a:rPr>
+              <a:t>mantener</a:t>
+            </a:r>
+            <a:r>
+              <a:rPr sz="1997" spc="-90" dirty="0">
+                <a:latin typeface="Verdana"/>
+                <a:cs typeface="Verdana"/>
+              </a:rPr>
+              <a:t> </a:t>
+            </a:r>
+            <a:r>
+              <a:rPr sz="1997" spc="-23" dirty="0">
+                <a:latin typeface="Verdana"/>
+                <a:cs typeface="Verdana"/>
+              </a:rPr>
+              <a:t>la</a:t>
+            </a:r>
+            <a:r>
+              <a:rPr sz="1997" spc="-90" dirty="0">
+                <a:latin typeface="Verdana"/>
+                <a:cs typeface="Verdana"/>
+              </a:rPr>
+              <a:t> </a:t>
+            </a:r>
+            <a:r>
+              <a:rPr sz="1997" dirty="0">
+                <a:latin typeface="Verdana"/>
+                <a:cs typeface="Verdana"/>
+              </a:rPr>
+              <a:t>claridad</a:t>
+            </a:r>
+            <a:r>
+              <a:rPr sz="1997" spc="-90" dirty="0">
+                <a:latin typeface="Verdana"/>
+                <a:cs typeface="Verdana"/>
+              </a:rPr>
+              <a:t> </a:t>
+            </a:r>
+            <a:r>
+              <a:rPr sz="1997" spc="47" dirty="0">
+                <a:latin typeface="Verdana"/>
+                <a:cs typeface="Verdana"/>
+              </a:rPr>
+              <a:t>en</a:t>
+            </a:r>
+            <a:r>
+              <a:rPr sz="1997" spc="-93" dirty="0">
+                <a:latin typeface="Verdana"/>
+                <a:cs typeface="Verdana"/>
+              </a:rPr>
+              <a:t> </a:t>
+            </a:r>
+            <a:r>
+              <a:rPr sz="1997" spc="-17" dirty="0">
+                <a:latin typeface="Verdana"/>
+                <a:cs typeface="Verdana"/>
+              </a:rPr>
+              <a:t>la </a:t>
+            </a:r>
+            <a:r>
+              <a:rPr sz="1997" spc="-7" dirty="0">
+                <a:latin typeface="Verdana"/>
+                <a:cs typeface="Verdana"/>
+              </a:rPr>
+              <a:t>estructura</a:t>
+            </a:r>
+            <a:r>
+              <a:rPr sz="1997" spc="-140" dirty="0">
+                <a:latin typeface="Verdana"/>
+                <a:cs typeface="Verdana"/>
+              </a:rPr>
+              <a:t> </a:t>
+            </a:r>
+            <a:r>
+              <a:rPr sz="1997" dirty="0">
+                <a:latin typeface="Verdana"/>
+                <a:cs typeface="Verdana"/>
+              </a:rPr>
+              <a:t>condicional,</a:t>
+            </a:r>
+            <a:r>
+              <a:rPr sz="1997" spc="-136" dirty="0">
+                <a:latin typeface="Verdana"/>
+                <a:cs typeface="Verdana"/>
+              </a:rPr>
+              <a:t> </a:t>
+            </a:r>
+            <a:r>
+              <a:rPr sz="1997" spc="-13" dirty="0">
+                <a:latin typeface="Verdana"/>
+                <a:cs typeface="Verdana"/>
+              </a:rPr>
+              <a:t>utilizar</a:t>
+            </a:r>
+            <a:r>
+              <a:rPr sz="1997" spc="-140" dirty="0">
+                <a:latin typeface="Verdana"/>
+                <a:cs typeface="Verdana"/>
+              </a:rPr>
+              <a:t> </a:t>
+            </a:r>
+            <a:r>
+              <a:rPr sz="1997" spc="-7" dirty="0">
+                <a:latin typeface="Verdana"/>
+                <a:cs typeface="Verdana"/>
+              </a:rPr>
+              <a:t>nombres descriptivos</a:t>
+            </a:r>
+            <a:r>
+              <a:rPr sz="1997" spc="-160" dirty="0">
+                <a:latin typeface="Verdana"/>
+                <a:cs typeface="Verdana"/>
+              </a:rPr>
+              <a:t> </a:t>
+            </a:r>
+            <a:r>
+              <a:rPr sz="1997" spc="-110" dirty="0">
+                <a:latin typeface="Verdana"/>
+                <a:cs typeface="Verdana"/>
+              </a:rPr>
+              <a:t>y</a:t>
+            </a:r>
+            <a:r>
+              <a:rPr sz="1997" spc="-160" dirty="0">
+                <a:latin typeface="Verdana"/>
+                <a:cs typeface="Verdana"/>
+              </a:rPr>
+              <a:t> </a:t>
+            </a:r>
+            <a:r>
+              <a:rPr sz="1997" spc="-37" dirty="0">
+                <a:latin typeface="Verdana"/>
+                <a:cs typeface="Verdana"/>
+              </a:rPr>
+              <a:t>evitar</a:t>
+            </a:r>
+            <a:r>
+              <a:rPr sz="1997" spc="-156" dirty="0">
+                <a:latin typeface="Verdana"/>
+                <a:cs typeface="Verdana"/>
+              </a:rPr>
+              <a:t> </a:t>
+            </a:r>
+            <a:r>
+              <a:rPr sz="1997" spc="-23" dirty="0">
+                <a:latin typeface="Verdana"/>
+                <a:cs typeface="Verdana"/>
+              </a:rPr>
+              <a:t>la</a:t>
+            </a:r>
+            <a:r>
+              <a:rPr sz="1997" spc="-160" dirty="0">
+                <a:latin typeface="Verdana"/>
+                <a:cs typeface="Verdana"/>
+              </a:rPr>
+              <a:t> </a:t>
+            </a:r>
+            <a:r>
+              <a:rPr sz="1997" spc="27" dirty="0">
+                <a:latin typeface="Verdana"/>
+                <a:cs typeface="Verdana"/>
+              </a:rPr>
+              <a:t>complejidad </a:t>
+            </a:r>
+            <a:r>
+              <a:rPr sz="1997" spc="-7" dirty="0">
+                <a:latin typeface="Verdana"/>
+                <a:cs typeface="Verdana"/>
+              </a:rPr>
+              <a:t>innecesaria.</a:t>
+            </a:r>
+            <a:endParaRPr sz="1997">
+              <a:latin typeface="Verdana"/>
+              <a:cs typeface="Verdana"/>
+            </a:endParaRPr>
+          </a:p>
+        </p:txBody>
+      </p:sp>
+      <p:sp>
+        <p:nvSpPr>
+          <p:cNvPr id="4" name="object 4"/>
+          <p:cNvSpPr txBox="1">
+            <a:spLocks noGrp="1"/>
+          </p:cNvSpPr>
+          <p:nvPr>
+            <p:ph type="title"/>
+          </p:nvPr>
+        </p:nvSpPr>
+        <p:spPr>
+          <a:xfrm>
+            <a:off x="7100219" y="865166"/>
+            <a:ext cx="3175736" cy="431215"/>
+          </a:xfrm>
+          <a:prstGeom prst="rect">
+            <a:avLst/>
+          </a:prstGeom>
+        </p:spPr>
+        <p:txBody>
+          <a:bodyPr vert="horz" wrap="square" lIns="0" tIns="10993" rIns="0" bIns="0" rtlCol="0" anchor="ctr">
+            <a:spAutoFit/>
+          </a:bodyPr>
+          <a:lstStyle/>
+          <a:p>
+            <a:pPr marL="8456">
+              <a:lnSpc>
+                <a:spcPct val="100000"/>
+              </a:lnSpc>
+              <a:spcBef>
+                <a:spcPts val="87"/>
+              </a:spcBef>
+            </a:pPr>
+            <a:r>
+              <a:rPr spc="-156" dirty="0"/>
+              <a:t>Mejores</a:t>
+            </a:r>
+            <a:r>
+              <a:rPr spc="-143" dirty="0"/>
+              <a:t> </a:t>
+            </a:r>
+            <a:r>
+              <a:rPr spc="-113" dirty="0"/>
+              <a:t>Prácticas</a:t>
+            </a:r>
+          </a:p>
+        </p:txBody>
+      </p:sp>
+      <p:sp>
+        <p:nvSpPr>
+          <p:cNvPr id="5" name="object 5"/>
+          <p:cNvSpPr/>
+          <p:nvPr/>
+        </p:nvSpPr>
+        <p:spPr>
+          <a:xfrm>
+            <a:off x="7091053" y="635816"/>
+            <a:ext cx="5089380" cy="76106"/>
+          </a:xfrm>
+          <a:custGeom>
+            <a:avLst/>
+            <a:gdLst/>
+            <a:ahLst/>
+            <a:cxnLst/>
+            <a:rect l="l" t="t" r="r" b="b"/>
+            <a:pathLst>
+              <a:path w="7643494" h="114300">
+                <a:moveTo>
+                  <a:pt x="0" y="114299"/>
+                </a:moveTo>
+                <a:lnTo>
+                  <a:pt x="7643227" y="114299"/>
+                </a:lnTo>
+                <a:lnTo>
+                  <a:pt x="7643227" y="0"/>
+                </a:lnTo>
+                <a:lnTo>
+                  <a:pt x="0" y="0"/>
+                </a:lnTo>
+                <a:lnTo>
+                  <a:pt x="0" y="114299"/>
+                </a:lnTo>
+                <a:close/>
+              </a:path>
+            </a:pathLst>
+          </a:custGeom>
+          <a:solidFill>
+            <a:srgbClr val="000000"/>
+          </a:solidFill>
+        </p:spPr>
+        <p:txBody>
+          <a:bodyPr wrap="square" lIns="0" tIns="0" rIns="0" bIns="0" rtlCol="0"/>
+          <a:lstStyle/>
+          <a:p>
+            <a:endParaRPr sz="1198"/>
+          </a:p>
+        </p:txBody>
+      </p:sp>
+      <p:pic>
+        <p:nvPicPr>
+          <p:cNvPr id="6" name="Imagen 5">
+            <a:extLst>
+              <a:ext uri="{FF2B5EF4-FFF2-40B4-BE49-F238E27FC236}">
+                <a16:creationId xmlns:a16="http://schemas.microsoft.com/office/drawing/2014/main" id="{80FD1945-9FAC-B292-6D9F-040CA9C5CF83}"/>
+              </a:ext>
+            </a:extLst>
+          </p:cNvPr>
+          <p:cNvPicPr>
+            <a:picLocks noChangeAspect="1"/>
+          </p:cNvPicPr>
+          <p:nvPr/>
+        </p:nvPicPr>
+        <p:blipFill>
+          <a:blip r:embed="rId3"/>
+          <a:stretch>
+            <a:fillRect/>
+          </a:stretch>
+        </p:blipFill>
+        <p:spPr>
+          <a:xfrm>
+            <a:off x="0" y="-7809"/>
+            <a:ext cx="10451203" cy="594104"/>
+          </a:xfrm>
+          <a:prstGeom prst="rect">
+            <a:avLst/>
+          </a:prstGeom>
+        </p:spPr>
+      </p:pic>
+      <p:pic>
+        <p:nvPicPr>
+          <p:cNvPr id="7" name="Imagen 6">
+            <a:extLst>
+              <a:ext uri="{FF2B5EF4-FFF2-40B4-BE49-F238E27FC236}">
+                <a16:creationId xmlns:a16="http://schemas.microsoft.com/office/drawing/2014/main" id="{D61159CC-A05F-C476-3C3E-D3F2D2E3D2BF}"/>
+              </a:ext>
+            </a:extLst>
+          </p:cNvPr>
+          <p:cNvPicPr>
+            <a:picLocks noChangeAspect="1"/>
+          </p:cNvPicPr>
+          <p:nvPr/>
+        </p:nvPicPr>
+        <p:blipFill>
+          <a:blip r:embed="rId4"/>
+          <a:stretch>
+            <a:fillRect/>
+          </a:stretch>
+        </p:blipFill>
+        <p:spPr>
+          <a:xfrm>
+            <a:off x="0" y="6117661"/>
+            <a:ext cx="11087100" cy="714375"/>
+          </a:xfrm>
+          <a:prstGeom prst="rect">
+            <a:avLst/>
+          </a:prstGeom>
+        </p:spPr>
+      </p:pic>
+    </p:spTree>
+  </p:cSld>
+  <p:clrMapOvr>
+    <a:masterClrMapping/>
+  </p:clrMapOvr>
+</p:sld>
+</file>
+
+<file path=ppt/slides/slide11.xml><?xml version="1.0" encoding="utf-8"?>
 <p:sld xmlns:a="http://schemas.openxmlformats.org/drawingml/2006/main" xmlns:r="http://schemas.openxmlformats.org/officeDocument/2006/relationships" xmlns:p="http://schemas.openxmlformats.org/presentationml/2006/main">
   <p:cSld>
     <p:spTree>
@@ -5476,7 +6151,7 @@
 </p:sld>
 </file>
 
-<file path=ppt/slides/slide11.xml><?xml version="1.0" encoding="utf-8"?>
+<file path=ppt/slides/slide12.xml><?xml version="1.0" encoding="utf-8"?>
 <p:sld xmlns:a="http://schemas.openxmlformats.org/drawingml/2006/main" xmlns:r="http://schemas.openxmlformats.org/officeDocument/2006/relationships" xmlns:p="http://schemas.openxmlformats.org/presentationml/2006/main">
   <p:cSld>
     <p:spTree>
@@ -6165,7 +6840,7 @@
 </p:sld>
 </file>
 
-<file path=ppt/slides/slide12.xml><?xml version="1.0" encoding="utf-8"?>
+<file path=ppt/slides/slide13.xml><?xml version="1.0" encoding="utf-8"?>
 <p:sld xmlns:a="http://schemas.openxmlformats.org/drawingml/2006/main" xmlns:r="http://schemas.openxmlformats.org/officeDocument/2006/relationships" xmlns:p="http://schemas.openxmlformats.org/presentationml/2006/main">
   <p:cSld>
     <p:spTree>
@@ -6832,7 +7507,177 @@
 </p:sld>
 </file>
 
-<file path=ppt/slides/slide13.xml><?xml version="1.0" encoding="utf-8"?>
+<file path=ppt/slides/slide14.xml><?xml version="1.0" encoding="utf-8"?>
+<p:sld xmlns:a="http://schemas.openxmlformats.org/drawingml/2006/main" xmlns:r="http://schemas.openxmlformats.org/officeDocument/2006/relationships" xmlns:p="http://schemas.openxmlformats.org/presentationml/2006/main">
+  <p:cSld>
+    <p:spTree>
+      <p:nvGrpSpPr>
+        <p:cNvPr id="1" name="">
+          <a:extLst>
+            <a:ext uri="{FF2B5EF4-FFF2-40B4-BE49-F238E27FC236}">
+              <a16:creationId xmlns:a16="http://schemas.microsoft.com/office/drawing/2014/main" id="{4364D4C1-C8CF-D8DA-4037-7B3E8CA56EAE}"/>
+            </a:ext>
+          </a:extLst>
+        </p:cNvPr>
+        <p:cNvGrpSpPr/>
+        <p:nvPr/>
+      </p:nvGrpSpPr>
+      <p:grpSpPr>
+        <a:xfrm>
+          <a:off x="0" y="0"/>
+          <a:ext cx="0" cy="0"/>
+          <a:chOff x="0" y="0"/>
+          <a:chExt cx="0" cy="0"/>
+        </a:xfrm>
+      </p:grpSpPr>
+      <p:sp>
+        <p:nvSpPr>
+          <p:cNvPr id="2" name="Título 1">
+            <a:extLst>
+              <a:ext uri="{FF2B5EF4-FFF2-40B4-BE49-F238E27FC236}">
+                <a16:creationId xmlns:a16="http://schemas.microsoft.com/office/drawing/2014/main" id="{B67F9073-34BB-C42E-1983-2746FE254270}"/>
+              </a:ext>
+            </a:extLst>
+          </p:cNvPr>
+          <p:cNvSpPr>
+            <a:spLocks noGrp="1"/>
+          </p:cNvSpPr>
+          <p:nvPr>
+            <p:ph type="title" idx="4294967295"/>
+          </p:nvPr>
+        </p:nvSpPr>
+        <p:spPr>
+          <a:xfrm>
+            <a:off x="492369" y="1395046"/>
+            <a:ext cx="11218985" cy="295642"/>
+          </a:xfrm>
+        </p:spPr>
+        <p:txBody>
+          <a:bodyPr>
+            <a:noAutofit/>
+          </a:bodyPr>
+          <a:lstStyle/>
+          <a:p>
+            <a:r>
+              <a:rPr lang="es-EC" sz="3200" b="1" dirty="0"/>
+              <a:t>Tarea: Implementación de bifurcaciones empleando Python</a:t>
+            </a:r>
+          </a:p>
+        </p:txBody>
+      </p:sp>
+      <p:sp>
+        <p:nvSpPr>
+          <p:cNvPr id="3" name="Marcador de contenido 2">
+            <a:extLst>
+              <a:ext uri="{FF2B5EF4-FFF2-40B4-BE49-F238E27FC236}">
+                <a16:creationId xmlns:a16="http://schemas.microsoft.com/office/drawing/2014/main" id="{80FFA34E-F3BA-390E-368D-4894037A3CBB}"/>
+              </a:ext>
+            </a:extLst>
+          </p:cNvPr>
+          <p:cNvSpPr>
+            <a:spLocks noGrp="1"/>
+          </p:cNvSpPr>
+          <p:nvPr>
+            <p:ph idx="4294967295"/>
+          </p:nvPr>
+        </p:nvSpPr>
+        <p:spPr>
+          <a:xfrm>
+            <a:off x="492369" y="1825625"/>
+            <a:ext cx="11218985" cy="4351338"/>
+          </a:xfrm>
+        </p:spPr>
+        <p:txBody>
+          <a:bodyPr>
+            <a:normAutofit/>
+          </a:bodyPr>
+          <a:lstStyle/>
+          <a:p>
+            <a:pPr algn="just"/>
+            <a:endParaRPr lang="es-EC" sz="1400" dirty="0"/>
+          </a:p>
+          <a:p>
+            <a:pPr algn="just"/>
+            <a:r>
+              <a:rPr lang="es-EC" sz="1600" dirty="0"/>
+              <a:t>Crear un script en Google </a:t>
+            </a:r>
+            <a:r>
+              <a:rPr lang="es-EC" sz="1600" dirty="0" err="1"/>
+              <a:t>Colab</a:t>
+            </a:r>
+            <a:r>
+              <a:rPr lang="es-EC" sz="1600" dirty="0"/>
+              <a:t> empleando Python que refleje el manejo de bifurcaciones.</a:t>
+            </a:r>
+            <a:endParaRPr lang="es-EC" sz="1400" b="1" dirty="0"/>
+          </a:p>
+          <a:p>
+            <a:endParaRPr lang="es-EC" sz="2000" dirty="0"/>
+          </a:p>
+        </p:txBody>
+      </p:sp>
+      <p:pic>
+        <p:nvPicPr>
+          <p:cNvPr id="4" name="Picture 2" descr="Lenguajes de programación más usados para desarrollar una web">
+            <a:extLst>
+              <a:ext uri="{FF2B5EF4-FFF2-40B4-BE49-F238E27FC236}">
+                <a16:creationId xmlns:a16="http://schemas.microsoft.com/office/drawing/2014/main" id="{7288E69B-A00E-5511-BDC8-3E23D67A1CA6}"/>
+              </a:ext>
+            </a:extLst>
+          </p:cNvPr>
+          <p:cNvPicPr>
+            <a:picLocks noChangeAspect="1" noChangeArrowheads="1"/>
+          </p:cNvPicPr>
+          <p:nvPr/>
+        </p:nvPicPr>
+        <p:blipFill>
+          <a:blip r:embed="rId2">
+            <a:extLst>
+              <a:ext uri="{28A0092B-C50C-407E-A947-70E740481C1C}">
+                <a14:useLocalDpi xmlns:a14="http://schemas.microsoft.com/office/drawing/2010/main" val="0"/>
+              </a:ext>
+            </a:extLst>
+          </a:blip>
+          <a:srcRect/>
+          <a:stretch>
+            <a:fillRect/>
+          </a:stretch>
+        </p:blipFill>
+        <p:spPr bwMode="auto">
+          <a:xfrm>
+            <a:off x="3982179" y="3096276"/>
+            <a:ext cx="4601984" cy="2802712"/>
+          </a:xfrm>
+          <a:prstGeom prst="rect">
+            <a:avLst/>
+          </a:prstGeom>
+          <a:noFill/>
+          <a:extLst>
+            <a:ext uri="{909E8E84-426E-40DD-AFC4-6F175D3DCCD1}">
+              <a14:hiddenFill xmlns:a14="http://schemas.microsoft.com/office/drawing/2010/main">
+                <a:solidFill>
+                  <a:srgbClr val="FFFFFF"/>
+                </a:solidFill>
+              </a14:hiddenFill>
+            </a:ext>
+          </a:extLst>
+        </p:spPr>
+      </p:pic>
+    </p:spTree>
+    <p:extLst>
+      <p:ext uri="{BB962C8B-B14F-4D97-AF65-F5344CB8AC3E}">
+        <p14:creationId xmlns:p14="http://schemas.microsoft.com/office/powerpoint/2010/main" val="186135857"/>
+      </p:ext>
+    </p:extLst>
+  </p:cSld>
+  <p:clrMapOvr>
+    <a:masterClrMapping/>
+  </p:clrMapOvr>
+</p:sld>
+</file>
+
+<file path=ppt/slides/slide15.xml><?xml version="1.0" encoding="utf-8"?>
 <p:sld xmlns:a="http://schemas.openxmlformats.org/drawingml/2006/main" xmlns:r="http://schemas.openxmlformats.org/officeDocument/2006/relationships" xmlns:p="http://schemas.openxmlformats.org/presentationml/2006/main">
   <p:cSld>
     <p:spTree>
@@ -7030,6 +7875,188 @@
           <a:chExt cx="0" cy="0"/>
         </a:xfrm>
       </p:grpSpPr>
+      <p:sp>
+        <p:nvSpPr>
+          <p:cNvPr id="2" name="Título 1">
+            <a:extLst>
+              <a:ext uri="{FF2B5EF4-FFF2-40B4-BE49-F238E27FC236}">
+                <a16:creationId xmlns:a16="http://schemas.microsoft.com/office/drawing/2014/main" id="{B8ABAACC-5240-4E68-A4E9-ACA6E7A4B0A2}"/>
+              </a:ext>
+            </a:extLst>
+          </p:cNvPr>
+          <p:cNvSpPr>
+            <a:spLocks noGrp="1"/>
+          </p:cNvSpPr>
+          <p:nvPr>
+            <p:ph type="title" idx="4294967295"/>
+          </p:nvPr>
+        </p:nvSpPr>
+        <p:spPr>
+          <a:xfrm>
+            <a:off x="343079" y="1409161"/>
+            <a:ext cx="11218985" cy="295642"/>
+          </a:xfrm>
+        </p:spPr>
+        <p:txBody>
+          <a:bodyPr>
+            <a:noAutofit/>
+          </a:bodyPr>
+          <a:lstStyle/>
+          <a:p>
+            <a:pPr algn="ctr"/>
+            <a:r>
+              <a:rPr lang="es-EC" sz="3200" b="1" dirty="0"/>
+              <a:t>Agenda</a:t>
+            </a:r>
+          </a:p>
+        </p:txBody>
+      </p:sp>
+      <p:sp>
+        <p:nvSpPr>
+          <p:cNvPr id="3" name="Marcador de contenido 2">
+            <a:extLst>
+              <a:ext uri="{FF2B5EF4-FFF2-40B4-BE49-F238E27FC236}">
+                <a16:creationId xmlns:a16="http://schemas.microsoft.com/office/drawing/2014/main" id="{055CBC30-9FA5-4F46-97C3-766A43887EE6}"/>
+              </a:ext>
+            </a:extLst>
+          </p:cNvPr>
+          <p:cNvSpPr>
+            <a:spLocks noGrp="1"/>
+          </p:cNvSpPr>
+          <p:nvPr>
+            <p:ph idx="4294967295"/>
+          </p:nvPr>
+        </p:nvSpPr>
+        <p:spPr>
+          <a:xfrm>
+            <a:off x="492369" y="2012615"/>
+            <a:ext cx="11218985" cy="1171984"/>
+          </a:xfrm>
+        </p:spPr>
+        <p:txBody>
+          <a:bodyPr>
+            <a:normAutofit/>
+          </a:bodyPr>
+          <a:lstStyle/>
+          <a:p>
+            <a:pPr marL="457200" indent="-457200" algn="ctr">
+              <a:buAutoNum type="arabicPeriod"/>
+            </a:pPr>
+            <a:r>
+              <a:rPr lang="es-EC" sz="2000" dirty="0"/>
+              <a:t>¿Qué es la sentencia </a:t>
+            </a:r>
+            <a:r>
+              <a:rPr lang="es-EC" sz="2000" dirty="0" err="1"/>
+              <a:t>If</a:t>
+            </a:r>
+            <a:r>
+              <a:rPr lang="es-EC" sz="2000" dirty="0"/>
+              <a:t>?</a:t>
+            </a:r>
+          </a:p>
+          <a:p>
+            <a:pPr marL="457200" indent="-457200" algn="ctr">
+              <a:buAutoNum type="arabicPeriod"/>
+            </a:pPr>
+            <a:r>
+              <a:rPr lang="es-EC" sz="2000" dirty="0"/>
+              <a:t> Condicionales simples y condicionales anidadas</a:t>
+            </a:r>
+          </a:p>
+          <a:p>
+            <a:pPr marL="457200" indent="-457200" algn="ctr">
+              <a:buAutoNum type="arabicPeriod"/>
+            </a:pPr>
+            <a:r>
+              <a:rPr lang="es-EC" sz="2000" dirty="0"/>
+              <a:t>Mejores prácticas para </a:t>
+            </a:r>
+            <a:r>
+              <a:rPr lang="es-EC" sz="2000"/>
+              <a:t>evitar errores</a:t>
+            </a:r>
+            <a:endParaRPr lang="es-EC" sz="2000" dirty="0"/>
+          </a:p>
+        </p:txBody>
+      </p:sp>
+      <p:pic>
+        <p:nvPicPr>
+          <p:cNvPr id="2050" name="Picture 2" descr="870.700+ Agenda Fotografías de stock, fotos e imágenes libres de derechos -  iStock | Calendario, Indice, Reloj">
+            <a:extLst>
+              <a:ext uri="{FF2B5EF4-FFF2-40B4-BE49-F238E27FC236}">
+                <a16:creationId xmlns:a16="http://schemas.microsoft.com/office/drawing/2014/main" id="{62461B0E-7D99-532C-B023-030084F16629}"/>
+              </a:ext>
+            </a:extLst>
+          </p:cNvPr>
+          <p:cNvPicPr>
+            <a:picLocks noChangeAspect="1" noChangeArrowheads="1"/>
+          </p:cNvPicPr>
+          <p:nvPr/>
+        </p:nvPicPr>
+        <p:blipFill>
+          <a:blip r:embed="rId2">
+            <a:extLst>
+              <a:ext uri="{28A0092B-C50C-407E-A947-70E740481C1C}">
+                <a14:useLocalDpi xmlns:a14="http://schemas.microsoft.com/office/drawing/2010/main" val="0"/>
+              </a:ext>
+            </a:extLst>
+          </a:blip>
+          <a:srcRect/>
+          <a:stretch>
+            <a:fillRect/>
+          </a:stretch>
+        </p:blipFill>
+        <p:spPr bwMode="auto">
+          <a:xfrm>
+            <a:off x="4818289" y="3429000"/>
+            <a:ext cx="2555421" cy="2555421"/>
+          </a:xfrm>
+          <a:prstGeom prst="rect">
+            <a:avLst/>
+          </a:prstGeom>
+          <a:noFill/>
+          <a:extLst>
+            <a:ext uri="{909E8E84-426E-40DD-AFC4-6F175D3DCCD1}">
+              <a14:hiddenFill xmlns:a14="http://schemas.microsoft.com/office/drawing/2010/main">
+                <a:solidFill>
+                  <a:srgbClr val="FFFFFF"/>
+                </a:solidFill>
+              </a14:hiddenFill>
+            </a:ext>
+          </a:extLst>
+        </p:spPr>
+      </p:pic>
+    </p:spTree>
+    <p:extLst>
+      <p:ext uri="{BB962C8B-B14F-4D97-AF65-F5344CB8AC3E}">
+        <p14:creationId xmlns:p14="http://schemas.microsoft.com/office/powerpoint/2010/main" val="15895652"/>
+      </p:ext>
+    </p:extLst>
+  </p:cSld>
+  <p:clrMapOvr>
+    <a:masterClrMapping/>
+  </p:clrMapOvr>
+</p:sld>
+</file>
+
+<file path=ppt/slides/slide4.xml><?xml version="1.0" encoding="utf-8"?>
+<p:sld xmlns:a="http://schemas.openxmlformats.org/drawingml/2006/main" xmlns:r="http://schemas.openxmlformats.org/officeDocument/2006/relationships" xmlns:p="http://schemas.openxmlformats.org/presentationml/2006/main">
+  <p:cSld>
+    <p:spTree>
+      <p:nvGrpSpPr>
+        <p:cNvPr id="1" name=""/>
+        <p:cNvGrpSpPr/>
+        <p:nvPr/>
+      </p:nvGrpSpPr>
+      <p:grpSpPr>
+        <a:xfrm>
+          <a:off x="0" y="0"/>
+          <a:ext cx="0" cy="0"/>
+          <a:chOff x="0" y="0"/>
+          <a:chExt cx="0" cy="0"/>
+        </a:xfrm>
+      </p:grpSpPr>
       <p:pic>
         <p:nvPicPr>
           <p:cNvPr id="2" name="object 2"/>
@@ -7704,7 +8731,7 @@
 </p:sld>
 </file>
 
-<file path=ppt/slides/slide4.xml><?xml version="1.0" encoding="utf-8"?>
+<file path=ppt/slides/slide5.xml><?xml version="1.0" encoding="utf-8"?>
 <p:sld xmlns:a="http://schemas.openxmlformats.org/drawingml/2006/main" xmlns:r="http://schemas.openxmlformats.org/officeDocument/2006/relationships" xmlns:p="http://schemas.openxmlformats.org/presentationml/2006/main">
   <p:cSld>
     <p:spTree>
@@ -8487,7 +9514,7 @@
 </p:sld>
 </file>
 
-<file path=ppt/slides/slide5.xml><?xml version="1.0" encoding="utf-8"?>
+<file path=ppt/slides/slide6.xml><?xml version="1.0" encoding="utf-8"?>
 <p:sld xmlns:a="http://schemas.openxmlformats.org/drawingml/2006/main" xmlns:r="http://schemas.openxmlformats.org/officeDocument/2006/relationships" xmlns:p="http://schemas.openxmlformats.org/presentationml/2006/main">
   <p:cSld>
     <p:spTree>
@@ -9224,7 +10251,7 @@
 </p:sld>
 </file>
 
-<file path=ppt/slides/slide6.xml><?xml version="1.0" encoding="utf-8"?>
+<file path=ppt/slides/slide7.xml><?xml version="1.0" encoding="utf-8"?>
 <p:sld xmlns:a="http://schemas.openxmlformats.org/drawingml/2006/main" xmlns:r="http://schemas.openxmlformats.org/officeDocument/2006/relationships" xmlns:p="http://schemas.openxmlformats.org/presentationml/2006/main">
   <p:cSld>
     <p:spTree>
@@ -9871,7 +10898,7 @@
 </p:sld>
 </file>
 
-<file path=ppt/slides/slide7.xml><?xml version="1.0" encoding="utf-8"?>
+<file path=ppt/slides/slide8.xml><?xml version="1.0" encoding="utf-8"?>
 <p:sld xmlns:a="http://schemas.openxmlformats.org/drawingml/2006/main" xmlns:r="http://schemas.openxmlformats.org/officeDocument/2006/relationships" xmlns:p="http://schemas.openxmlformats.org/presentationml/2006/main">
   <p:cSld>
     <p:spTree>
@@ -10543,7 +11570,7 @@
 </p:sld>
 </file>
 
-<file path=ppt/slides/slide8.xml><?xml version="1.0" encoding="utf-8"?>
+<file path=ppt/slides/slide9.xml><?xml version="1.0" encoding="utf-8"?>
 <p:sld xmlns:a="http://schemas.openxmlformats.org/drawingml/2006/main" xmlns:r="http://schemas.openxmlformats.org/officeDocument/2006/relationships" xmlns:p="http://schemas.openxmlformats.org/presentationml/2006/main">
   <p:cSld>
     <p:spTree>
@@ -11202,674 +12229,6 @@
         </p:nvPicPr>
         <p:blipFill>
           <a:blip r:embed="rId3"/>
-          <a:stretch>
-            <a:fillRect/>
-          </a:stretch>
-        </p:blipFill>
-        <p:spPr>
-          <a:xfrm>
-            <a:off x="0" y="6117661"/>
-            <a:ext cx="11087100" cy="714375"/>
-          </a:xfrm>
-          <a:prstGeom prst="rect">
-            <a:avLst/>
-          </a:prstGeom>
-        </p:spPr>
-      </p:pic>
-    </p:spTree>
-  </p:cSld>
-  <p:clrMapOvr>
-    <a:masterClrMapping/>
-  </p:clrMapOvr>
-</p:sld>
-</file>
-
-<file path=ppt/slides/slide9.xml><?xml version="1.0" encoding="utf-8"?>
-<p:sld xmlns:a="http://schemas.openxmlformats.org/drawingml/2006/main" xmlns:r="http://schemas.openxmlformats.org/officeDocument/2006/relationships" xmlns:p="http://schemas.openxmlformats.org/presentationml/2006/main">
-  <p:cSld>
-    <p:spTree>
-      <p:nvGrpSpPr>
-        <p:cNvPr id="1" name=""/>
-        <p:cNvGrpSpPr/>
-        <p:nvPr/>
-      </p:nvGrpSpPr>
-      <p:grpSpPr>
-        <a:xfrm>
-          <a:off x="0" y="0"/>
-          <a:ext cx="0" cy="0"/>
-          <a:chOff x="0" y="0"/>
-          <a:chExt cx="0" cy="0"/>
-        </a:xfrm>
-      </p:grpSpPr>
-      <p:pic>
-        <p:nvPicPr>
-          <p:cNvPr id="2" name="object 2"/>
-          <p:cNvPicPr/>
-          <p:nvPr/>
-        </p:nvPicPr>
-        <p:blipFill>
-          <a:blip r:embed="rId2" cstate="print"/>
-          <a:stretch>
-            <a:fillRect/>
-          </a:stretch>
-        </p:blipFill>
-        <p:spPr>
-          <a:xfrm>
-            <a:off x="786292" y="3104537"/>
-            <a:ext cx="10610451" cy="2987162"/>
-          </a:xfrm>
-          <a:prstGeom prst="rect">
-            <a:avLst/>
-          </a:prstGeom>
-        </p:spPr>
-      </p:pic>
-      <p:sp>
-        <p:nvSpPr>
-          <p:cNvPr id="3" name="object 3"/>
-          <p:cNvSpPr txBox="1"/>
-          <p:nvPr/>
-        </p:nvSpPr>
-        <p:spPr>
-          <a:xfrm>
-            <a:off x="775061" y="542264"/>
-            <a:ext cx="5371818" cy="2014177"/>
-          </a:xfrm>
-          <a:prstGeom prst="rect">
-            <a:avLst/>
-          </a:prstGeom>
-        </p:spPr>
-        <p:txBody>
-          <a:bodyPr vert="horz" wrap="square" lIns="0" tIns="38898" rIns="0" bIns="0" rtlCol="0">
-            <a:spAutoFit/>
-          </a:bodyPr>
-          <a:lstStyle/>
-          <a:p>
-            <a:pPr marL="8456" marR="3382">
-              <a:lnSpc>
-                <a:spcPts val="2197"/>
-              </a:lnSpc>
-              <a:spcBef>
-                <a:spcPts val="306"/>
-              </a:spcBef>
-            </a:pPr>
-            <a:r>
-              <a:rPr sz="1997" spc="-7" dirty="0">
-                <a:latin typeface="Verdana"/>
-                <a:cs typeface="Verdana"/>
-              </a:rPr>
-              <a:t>Para</a:t>
-            </a:r>
-            <a:r>
-              <a:rPr sz="1997" spc="-130" dirty="0">
-                <a:latin typeface="Verdana"/>
-                <a:cs typeface="Verdana"/>
-              </a:rPr>
-              <a:t> </a:t>
-            </a:r>
-            <a:r>
-              <a:rPr sz="1997" b="1" spc="-100" dirty="0">
-                <a:latin typeface="Verdana"/>
-                <a:cs typeface="Verdana"/>
-              </a:rPr>
-              <a:t>optimizar</a:t>
-            </a:r>
-            <a:r>
-              <a:rPr sz="1997" b="1" spc="-110" dirty="0">
-                <a:latin typeface="Verdana"/>
-                <a:cs typeface="Verdana"/>
-              </a:rPr>
-              <a:t> </a:t>
-            </a:r>
-            <a:r>
-              <a:rPr sz="1997" spc="-23" dirty="0">
-                <a:latin typeface="Verdana"/>
-                <a:cs typeface="Verdana"/>
-              </a:rPr>
-              <a:t>la</a:t>
-            </a:r>
-            <a:r>
-              <a:rPr sz="1997" spc="-130" dirty="0">
-                <a:latin typeface="Verdana"/>
-                <a:cs typeface="Verdana"/>
-              </a:rPr>
-              <a:t> </a:t>
-            </a:r>
-            <a:r>
-              <a:rPr sz="1997" dirty="0">
-                <a:latin typeface="Verdana"/>
-                <a:cs typeface="Verdana"/>
-              </a:rPr>
-              <a:t>lógica</a:t>
-            </a:r>
-            <a:r>
-              <a:rPr sz="1997" spc="-130" dirty="0">
-                <a:latin typeface="Verdana"/>
-                <a:cs typeface="Verdana"/>
-              </a:rPr>
-              <a:t> </a:t>
-            </a:r>
-            <a:r>
-              <a:rPr sz="1997" spc="60" dirty="0">
-                <a:latin typeface="Verdana"/>
-                <a:cs typeface="Verdana"/>
-              </a:rPr>
-              <a:t>de</a:t>
-            </a:r>
-            <a:r>
-              <a:rPr sz="1997" spc="-130" dirty="0">
-                <a:latin typeface="Verdana"/>
-                <a:cs typeface="Verdana"/>
-              </a:rPr>
-              <a:t> </a:t>
-            </a:r>
-            <a:r>
-              <a:rPr sz="1997" spc="-7" dirty="0">
-                <a:latin typeface="Verdana"/>
-                <a:cs typeface="Verdana"/>
-              </a:rPr>
-              <a:t>programación </a:t>
-            </a:r>
-            <a:r>
-              <a:rPr sz="1997" spc="53" dirty="0">
-                <a:latin typeface="Verdana"/>
-                <a:cs typeface="Verdana"/>
-              </a:rPr>
-              <a:t>con</a:t>
-            </a:r>
-            <a:r>
-              <a:rPr sz="1997" spc="-152" dirty="0">
-                <a:latin typeface="Verdana"/>
-                <a:cs typeface="Verdana"/>
-              </a:rPr>
-              <a:t> </a:t>
-            </a:r>
-            <a:r>
-              <a:rPr sz="1997" spc="-23" dirty="0">
-                <a:latin typeface="Verdana"/>
-                <a:cs typeface="Verdana"/>
-              </a:rPr>
-              <a:t>la</a:t>
-            </a:r>
-            <a:r>
-              <a:rPr sz="1997" spc="-150" dirty="0">
-                <a:latin typeface="Verdana"/>
-                <a:cs typeface="Verdana"/>
-              </a:rPr>
-              <a:t> </a:t>
-            </a:r>
-            <a:r>
-              <a:rPr sz="1997" dirty="0">
-                <a:latin typeface="Verdana"/>
-                <a:cs typeface="Verdana"/>
-              </a:rPr>
-              <a:t>sentencia</a:t>
-            </a:r>
-            <a:r>
-              <a:rPr sz="1997" spc="-150" dirty="0">
-                <a:latin typeface="Verdana"/>
-                <a:cs typeface="Verdana"/>
-              </a:rPr>
-              <a:t> </a:t>
-            </a:r>
-            <a:r>
-              <a:rPr sz="2064" i="1" spc="-43" dirty="0">
-                <a:latin typeface="Verdana"/>
-                <a:cs typeface="Verdana"/>
-              </a:rPr>
-              <a:t>if</a:t>
-            </a:r>
-            <a:r>
-              <a:rPr sz="2064" i="1" spc="-176" dirty="0">
-                <a:latin typeface="Verdana"/>
-                <a:cs typeface="Verdana"/>
-              </a:rPr>
-              <a:t> </a:t>
-            </a:r>
-            <a:r>
-              <a:rPr sz="1997" spc="47" dirty="0">
-                <a:latin typeface="Verdana"/>
-                <a:cs typeface="Verdana"/>
-              </a:rPr>
-              <a:t>en</a:t>
-            </a:r>
-            <a:r>
-              <a:rPr sz="1997" spc="-150" dirty="0">
-                <a:latin typeface="Verdana"/>
-                <a:cs typeface="Verdana"/>
-              </a:rPr>
-              <a:t> </a:t>
-            </a:r>
-            <a:r>
-              <a:rPr sz="1997" dirty="0">
-                <a:latin typeface="Verdana"/>
-                <a:cs typeface="Verdana"/>
-              </a:rPr>
-              <a:t>Python,</a:t>
-            </a:r>
-            <a:r>
-              <a:rPr sz="1997" spc="-150" dirty="0">
-                <a:latin typeface="Verdana"/>
-                <a:cs typeface="Verdana"/>
-              </a:rPr>
-              <a:t> </a:t>
-            </a:r>
-            <a:r>
-              <a:rPr sz="1997" spc="-17" dirty="0">
-                <a:latin typeface="Verdana"/>
-                <a:cs typeface="Verdana"/>
-              </a:rPr>
-              <a:t>es </a:t>
-            </a:r>
-            <a:r>
-              <a:rPr sz="1997" dirty="0">
-                <a:latin typeface="Verdana"/>
-                <a:cs typeface="Verdana"/>
-              </a:rPr>
-              <a:t>importante</a:t>
-            </a:r>
-            <a:r>
-              <a:rPr sz="1997" spc="-73" dirty="0">
-                <a:latin typeface="Verdana"/>
-                <a:cs typeface="Verdana"/>
-              </a:rPr>
-              <a:t> </a:t>
-            </a:r>
-            <a:r>
-              <a:rPr sz="1997" dirty="0">
-                <a:latin typeface="Verdana"/>
-                <a:cs typeface="Verdana"/>
-              </a:rPr>
-              <a:t>seguir</a:t>
-            </a:r>
-            <a:r>
-              <a:rPr sz="1997" spc="-73" dirty="0">
-                <a:latin typeface="Verdana"/>
-                <a:cs typeface="Verdana"/>
-              </a:rPr>
-              <a:t> </a:t>
-            </a:r>
-            <a:r>
-              <a:rPr sz="1997" b="1" spc="-120" dirty="0">
-                <a:latin typeface="Verdana"/>
-                <a:cs typeface="Verdana"/>
-              </a:rPr>
-              <a:t>mejores</a:t>
-            </a:r>
-            <a:r>
-              <a:rPr sz="1997" b="1" spc="-20" dirty="0">
-                <a:latin typeface="Verdana"/>
-                <a:cs typeface="Verdana"/>
-              </a:rPr>
-              <a:t> </a:t>
-            </a:r>
-            <a:r>
-              <a:rPr sz="1997" b="1" spc="-123" dirty="0">
-                <a:latin typeface="Verdana"/>
-                <a:cs typeface="Verdana"/>
-              </a:rPr>
-              <a:t>prácticas</a:t>
-            </a:r>
-            <a:r>
-              <a:rPr sz="1997" spc="-123" dirty="0">
-                <a:latin typeface="Verdana"/>
-                <a:cs typeface="Verdana"/>
-              </a:rPr>
-              <a:t>.</a:t>
-            </a:r>
-            <a:r>
-              <a:rPr sz="1997" spc="-73" dirty="0">
-                <a:latin typeface="Verdana"/>
-                <a:cs typeface="Verdana"/>
-              </a:rPr>
-              <a:t> </a:t>
-            </a:r>
-            <a:r>
-              <a:rPr sz="1997" spc="-13" dirty="0">
-                <a:latin typeface="Verdana"/>
-                <a:cs typeface="Verdana"/>
-              </a:rPr>
-              <a:t>Esto </a:t>
-            </a:r>
-            <a:r>
-              <a:rPr sz="1997" dirty="0">
-                <a:latin typeface="Verdana"/>
-                <a:cs typeface="Verdana"/>
-              </a:rPr>
-              <a:t>incluye</a:t>
-            </a:r>
-            <a:r>
-              <a:rPr sz="1997" spc="-93" dirty="0">
-                <a:latin typeface="Verdana"/>
-                <a:cs typeface="Verdana"/>
-              </a:rPr>
-              <a:t> </a:t>
-            </a:r>
-            <a:r>
-              <a:rPr sz="1997" dirty="0">
-                <a:latin typeface="Verdana"/>
-                <a:cs typeface="Verdana"/>
-              </a:rPr>
-              <a:t>mantener</a:t>
-            </a:r>
-            <a:r>
-              <a:rPr sz="1997" spc="-90" dirty="0">
-                <a:latin typeface="Verdana"/>
-                <a:cs typeface="Verdana"/>
-              </a:rPr>
-              <a:t> </a:t>
-            </a:r>
-            <a:r>
-              <a:rPr sz="1997" spc="-23" dirty="0">
-                <a:latin typeface="Verdana"/>
-                <a:cs typeface="Verdana"/>
-              </a:rPr>
-              <a:t>la</a:t>
-            </a:r>
-            <a:r>
-              <a:rPr sz="1997" spc="-90" dirty="0">
-                <a:latin typeface="Verdana"/>
-                <a:cs typeface="Verdana"/>
-              </a:rPr>
-              <a:t> </a:t>
-            </a:r>
-            <a:r>
-              <a:rPr sz="1997" dirty="0">
-                <a:latin typeface="Verdana"/>
-                <a:cs typeface="Verdana"/>
-              </a:rPr>
-              <a:t>claridad</a:t>
-            </a:r>
-            <a:r>
-              <a:rPr sz="1997" spc="-90" dirty="0">
-                <a:latin typeface="Verdana"/>
-                <a:cs typeface="Verdana"/>
-              </a:rPr>
-              <a:t> </a:t>
-            </a:r>
-            <a:r>
-              <a:rPr sz="1997" spc="47" dirty="0">
-                <a:latin typeface="Verdana"/>
-                <a:cs typeface="Verdana"/>
-              </a:rPr>
-              <a:t>en</a:t>
-            </a:r>
-            <a:r>
-              <a:rPr sz="1997" spc="-93" dirty="0">
-                <a:latin typeface="Verdana"/>
-                <a:cs typeface="Verdana"/>
-              </a:rPr>
-              <a:t> </a:t>
-            </a:r>
-            <a:r>
-              <a:rPr sz="1997" spc="-17" dirty="0">
-                <a:latin typeface="Verdana"/>
-                <a:cs typeface="Verdana"/>
-              </a:rPr>
-              <a:t>la </a:t>
-            </a:r>
-            <a:r>
-              <a:rPr sz="1997" spc="-7" dirty="0">
-                <a:latin typeface="Verdana"/>
-                <a:cs typeface="Verdana"/>
-              </a:rPr>
-              <a:t>estructura</a:t>
-            </a:r>
-            <a:r>
-              <a:rPr sz="1997" spc="-140" dirty="0">
-                <a:latin typeface="Verdana"/>
-                <a:cs typeface="Verdana"/>
-              </a:rPr>
-              <a:t> </a:t>
-            </a:r>
-            <a:r>
-              <a:rPr sz="1997" dirty="0">
-                <a:latin typeface="Verdana"/>
-                <a:cs typeface="Verdana"/>
-              </a:rPr>
-              <a:t>condicional,</a:t>
-            </a:r>
-            <a:r>
-              <a:rPr sz="1997" spc="-136" dirty="0">
-                <a:latin typeface="Verdana"/>
-                <a:cs typeface="Verdana"/>
-              </a:rPr>
-              <a:t> </a:t>
-            </a:r>
-            <a:r>
-              <a:rPr sz="1997" spc="-13" dirty="0">
-                <a:latin typeface="Verdana"/>
-                <a:cs typeface="Verdana"/>
-              </a:rPr>
-              <a:t>utilizar</a:t>
-            </a:r>
-            <a:r>
-              <a:rPr sz="1997" spc="-140" dirty="0">
-                <a:latin typeface="Verdana"/>
-                <a:cs typeface="Verdana"/>
-              </a:rPr>
-              <a:t> </a:t>
-            </a:r>
-            <a:r>
-              <a:rPr sz="1997" spc="-7" dirty="0">
-                <a:latin typeface="Verdana"/>
-                <a:cs typeface="Verdana"/>
-              </a:rPr>
-              <a:t>nombres descriptivos</a:t>
-            </a:r>
-            <a:r>
-              <a:rPr sz="1997" spc="-160" dirty="0">
-                <a:latin typeface="Verdana"/>
-                <a:cs typeface="Verdana"/>
-              </a:rPr>
-              <a:t> </a:t>
-            </a:r>
-            <a:r>
-              <a:rPr sz="1997" spc="-110" dirty="0">
-                <a:latin typeface="Verdana"/>
-                <a:cs typeface="Verdana"/>
-              </a:rPr>
-              <a:t>y</a:t>
-            </a:r>
-            <a:r>
-              <a:rPr sz="1997" spc="-160" dirty="0">
-                <a:latin typeface="Verdana"/>
-                <a:cs typeface="Verdana"/>
-              </a:rPr>
-              <a:t> </a:t>
-            </a:r>
-            <a:r>
-              <a:rPr sz="1997" spc="-37" dirty="0">
-                <a:latin typeface="Verdana"/>
-                <a:cs typeface="Verdana"/>
-              </a:rPr>
-              <a:t>evitar</a:t>
-            </a:r>
-            <a:r>
-              <a:rPr sz="1997" spc="-156" dirty="0">
-                <a:latin typeface="Verdana"/>
-                <a:cs typeface="Verdana"/>
-              </a:rPr>
-              <a:t> </a:t>
-            </a:r>
-            <a:r>
-              <a:rPr sz="1997" spc="-23" dirty="0">
-                <a:latin typeface="Verdana"/>
-                <a:cs typeface="Verdana"/>
-              </a:rPr>
-              <a:t>la</a:t>
-            </a:r>
-            <a:r>
-              <a:rPr sz="1997" spc="-160" dirty="0">
-                <a:latin typeface="Verdana"/>
-                <a:cs typeface="Verdana"/>
-              </a:rPr>
-              <a:t> </a:t>
-            </a:r>
-            <a:r>
-              <a:rPr sz="1997" spc="27" dirty="0">
-                <a:latin typeface="Verdana"/>
-                <a:cs typeface="Verdana"/>
-              </a:rPr>
-              <a:t>complejidad </a:t>
-            </a:r>
-            <a:r>
-              <a:rPr sz="1997" spc="-7" dirty="0">
-                <a:latin typeface="Verdana"/>
-                <a:cs typeface="Verdana"/>
-              </a:rPr>
-              <a:t>innecesaria.</a:t>
-            </a:r>
-            <a:endParaRPr sz="1997">
-              <a:latin typeface="Verdana"/>
-              <a:cs typeface="Verdana"/>
-            </a:endParaRPr>
-          </a:p>
-        </p:txBody>
-      </p:sp>
-      <p:sp>
-        <p:nvSpPr>
-          <p:cNvPr id="4" name="object 4"/>
-          <p:cNvSpPr txBox="1">
-            <a:spLocks noGrp="1"/>
-          </p:cNvSpPr>
-          <p:nvPr>
-            <p:ph type="title"/>
-          </p:nvPr>
-        </p:nvSpPr>
-        <p:spPr>
-          <a:xfrm>
-            <a:off x="7100219" y="865166"/>
-            <a:ext cx="3175736" cy="431215"/>
-          </a:xfrm>
-          <a:prstGeom prst="rect">
-            <a:avLst/>
-          </a:prstGeom>
-        </p:spPr>
-        <p:txBody>
-          <a:bodyPr vert="horz" wrap="square" lIns="0" tIns="10993" rIns="0" bIns="0" rtlCol="0" anchor="ctr">
-            <a:spAutoFit/>
-          </a:bodyPr>
-          <a:lstStyle/>
-          <a:p>
-            <a:pPr marL="8456">
-              <a:lnSpc>
-                <a:spcPct val="100000"/>
-              </a:lnSpc>
-              <a:spcBef>
-                <a:spcPts val="87"/>
-              </a:spcBef>
-            </a:pPr>
-            <a:r>
-              <a:rPr spc="-156" dirty="0"/>
-              <a:t>Mejores</a:t>
-            </a:r>
-            <a:r>
-              <a:rPr spc="-143" dirty="0"/>
-              <a:t> </a:t>
-            </a:r>
-            <a:r>
-              <a:rPr spc="-113" dirty="0"/>
-              <a:t>Prácticas</a:t>
-            </a:r>
-          </a:p>
-        </p:txBody>
-      </p:sp>
-      <p:sp>
-        <p:nvSpPr>
-          <p:cNvPr id="5" name="object 5"/>
-          <p:cNvSpPr/>
-          <p:nvPr/>
-        </p:nvSpPr>
-        <p:spPr>
-          <a:xfrm>
-            <a:off x="7091053" y="635816"/>
-            <a:ext cx="5089380" cy="76106"/>
-          </a:xfrm>
-          <a:custGeom>
-            <a:avLst/>
-            <a:gdLst/>
-            <a:ahLst/>
-            <a:cxnLst/>
-            <a:rect l="l" t="t" r="r" b="b"/>
-            <a:pathLst>
-              <a:path w="7643494" h="114300">
-                <a:moveTo>
-                  <a:pt x="0" y="114299"/>
-                </a:moveTo>
-                <a:lnTo>
-                  <a:pt x="7643227" y="114299"/>
-                </a:lnTo>
-                <a:lnTo>
-                  <a:pt x="7643227" y="0"/>
-                </a:lnTo>
-                <a:lnTo>
-                  <a:pt x="0" y="0"/>
-                </a:lnTo>
-                <a:lnTo>
-                  <a:pt x="0" y="114299"/>
-                </a:lnTo>
-                <a:close/>
-              </a:path>
-            </a:pathLst>
-          </a:custGeom>
-          <a:solidFill>
-            <a:srgbClr val="000000"/>
-          </a:solidFill>
-        </p:spPr>
-        <p:txBody>
-          <a:bodyPr wrap="square" lIns="0" tIns="0" rIns="0" bIns="0" rtlCol="0"/>
-          <a:lstStyle/>
-          <a:p>
-            <a:endParaRPr sz="1198"/>
-          </a:p>
-        </p:txBody>
-      </p:sp>
-      <p:pic>
-        <p:nvPicPr>
-          <p:cNvPr id="6" name="Imagen 5">
-            <a:extLst>
-              <a:ext uri="{FF2B5EF4-FFF2-40B4-BE49-F238E27FC236}">
-                <a16:creationId xmlns:a16="http://schemas.microsoft.com/office/drawing/2014/main" id="{80FD1945-9FAC-B292-6D9F-040CA9C5CF83}"/>
-              </a:ext>
-            </a:extLst>
-          </p:cNvPr>
-          <p:cNvPicPr>
-            <a:picLocks noChangeAspect="1"/>
-          </p:cNvPicPr>
-          <p:nvPr/>
-        </p:nvPicPr>
-        <p:blipFill>
-          <a:blip r:embed="rId3"/>
-          <a:stretch>
-            <a:fillRect/>
-          </a:stretch>
-        </p:blipFill>
-        <p:spPr>
-          <a:xfrm>
-            <a:off x="0" y="-7809"/>
-            <a:ext cx="10451203" cy="594104"/>
-          </a:xfrm>
-          <a:prstGeom prst="rect">
-            <a:avLst/>
-          </a:prstGeom>
-        </p:spPr>
-      </p:pic>
-      <p:pic>
-        <p:nvPicPr>
-          <p:cNvPr id="7" name="Imagen 6">
-            <a:extLst>
-              <a:ext uri="{FF2B5EF4-FFF2-40B4-BE49-F238E27FC236}">
-                <a16:creationId xmlns:a16="http://schemas.microsoft.com/office/drawing/2014/main" id="{D61159CC-A05F-C476-3C3E-D3F2D2E3D2BF}"/>
-              </a:ext>
-            </a:extLst>
-          </p:cNvPr>
-          <p:cNvPicPr>
-            <a:picLocks noChangeAspect="1"/>
-          </p:cNvPicPr>
-          <p:nvPr/>
-        </p:nvPicPr>
-        <p:blipFill>
-          <a:blip r:embed="rId4"/>
           <a:stretch>
             <a:fillRect/>
           </a:stretch>

</xml_diff>